<commit_message>
new images, pptx changes
</commit_message>
<xml_diff>
--- a/Whitted Raytracing.pptx
+++ b/Whitted Raytracing.pptx
@@ -272,7 +272,7 @@
           <a:p>
             <a:fld id="{7CCE2273-DA3E-49F7-8FD4-2311A962A9B3}" type="datetimeFigureOut">
               <a:rPr lang="en-US" smtClean="0"/>
-              <a:t>9/6/2021</a:t>
+              <a:t>9/7/2021</a:t>
             </a:fld>
             <a:endParaRPr lang="en-US"/>
           </a:p>
@@ -470,7 +470,7 @@
           <a:p>
             <a:fld id="{7CCE2273-DA3E-49F7-8FD4-2311A962A9B3}" type="datetimeFigureOut">
               <a:rPr lang="en-US" smtClean="0"/>
-              <a:t>9/6/2021</a:t>
+              <a:t>9/7/2021</a:t>
             </a:fld>
             <a:endParaRPr lang="en-US"/>
           </a:p>
@@ -678,7 +678,7 @@
           <a:p>
             <a:fld id="{7CCE2273-DA3E-49F7-8FD4-2311A962A9B3}" type="datetimeFigureOut">
               <a:rPr lang="en-US" smtClean="0"/>
-              <a:t>9/6/2021</a:t>
+              <a:t>9/7/2021</a:t>
             </a:fld>
             <a:endParaRPr lang="en-US"/>
           </a:p>
@@ -876,7 +876,7 @@
           <a:p>
             <a:fld id="{7CCE2273-DA3E-49F7-8FD4-2311A962A9B3}" type="datetimeFigureOut">
               <a:rPr lang="en-US" smtClean="0"/>
-              <a:t>9/6/2021</a:t>
+              <a:t>9/7/2021</a:t>
             </a:fld>
             <a:endParaRPr lang="en-US"/>
           </a:p>
@@ -1151,7 +1151,7 @@
           <a:p>
             <a:fld id="{7CCE2273-DA3E-49F7-8FD4-2311A962A9B3}" type="datetimeFigureOut">
               <a:rPr lang="en-US" smtClean="0"/>
-              <a:t>9/6/2021</a:t>
+              <a:t>9/7/2021</a:t>
             </a:fld>
             <a:endParaRPr lang="en-US"/>
           </a:p>
@@ -1416,7 +1416,7 @@
           <a:p>
             <a:fld id="{7CCE2273-DA3E-49F7-8FD4-2311A962A9B3}" type="datetimeFigureOut">
               <a:rPr lang="en-US" smtClean="0"/>
-              <a:t>9/6/2021</a:t>
+              <a:t>9/7/2021</a:t>
             </a:fld>
             <a:endParaRPr lang="en-US"/>
           </a:p>
@@ -1828,7 +1828,7 @@
           <a:p>
             <a:fld id="{7CCE2273-DA3E-49F7-8FD4-2311A962A9B3}" type="datetimeFigureOut">
               <a:rPr lang="en-US" smtClean="0"/>
-              <a:t>9/6/2021</a:t>
+              <a:t>9/7/2021</a:t>
             </a:fld>
             <a:endParaRPr lang="en-US"/>
           </a:p>
@@ -1969,7 +1969,7 @@
           <a:p>
             <a:fld id="{7CCE2273-DA3E-49F7-8FD4-2311A962A9B3}" type="datetimeFigureOut">
               <a:rPr lang="en-US" smtClean="0"/>
-              <a:t>9/6/2021</a:t>
+              <a:t>9/7/2021</a:t>
             </a:fld>
             <a:endParaRPr lang="en-US"/>
           </a:p>
@@ -2082,7 +2082,7 @@
           <a:p>
             <a:fld id="{7CCE2273-DA3E-49F7-8FD4-2311A962A9B3}" type="datetimeFigureOut">
               <a:rPr lang="en-US" smtClean="0"/>
-              <a:t>9/6/2021</a:t>
+              <a:t>9/7/2021</a:t>
             </a:fld>
             <a:endParaRPr lang="en-US"/>
           </a:p>
@@ -2393,7 +2393,7 @@
           <a:p>
             <a:fld id="{7CCE2273-DA3E-49F7-8FD4-2311A962A9B3}" type="datetimeFigureOut">
               <a:rPr lang="en-US" smtClean="0"/>
-              <a:t>9/6/2021</a:t>
+              <a:t>9/7/2021</a:t>
             </a:fld>
             <a:endParaRPr lang="en-US"/>
           </a:p>
@@ -2681,7 +2681,7 @@
           <a:p>
             <a:fld id="{7CCE2273-DA3E-49F7-8FD4-2311A962A9B3}" type="datetimeFigureOut">
               <a:rPr lang="en-US" smtClean="0"/>
-              <a:t>9/6/2021</a:t>
+              <a:t>9/7/2021</a:t>
             </a:fld>
             <a:endParaRPr lang="en-US"/>
           </a:p>
@@ -2928,7 +2928,7 @@
           <a:p>
             <a:fld id="{7CCE2273-DA3E-49F7-8FD4-2311A962A9B3}" type="datetimeFigureOut">
               <a:rPr lang="en-US" smtClean="0"/>
-              <a:t>9/6/2021</a:t>
+              <a:t>9/7/2021</a:t>
             </a:fld>
             <a:endParaRPr lang="en-US"/>
           </a:p>
@@ -9502,12 +9502,54 @@
           </a:prstGeom>
         </p:spPr>
       </p:pic>
+      <p:sp>
+        <p:nvSpPr>
+          <p:cNvPr id="14" name="TextBox 13">
+            <a:extLst>
+              <a:ext uri="{FF2B5EF4-FFF2-40B4-BE49-F238E27FC236}">
+                <a16:creationId xmlns:a16="http://schemas.microsoft.com/office/drawing/2014/main" id="{C6A2F4C2-E10D-441F-BEE7-DB36E4544901}"/>
+              </a:ext>
+            </a:extLst>
+          </p:cNvPr>
+          <p:cNvSpPr txBox="1"/>
+          <p:nvPr/>
+        </p:nvSpPr>
+        <p:spPr>
+          <a:xfrm>
+            <a:off x="7482971" y="5684461"/>
+            <a:ext cx="2938753" cy="307777"/>
+          </a:xfrm>
+          <a:prstGeom prst="rect">
+            <a:avLst/>
+          </a:prstGeom>
+          <a:noFill/>
+        </p:spPr>
+        <p:txBody>
+          <a:bodyPr wrap="none" rtlCol="0">
+            <a:spAutoFit/>
+          </a:bodyPr>
+          <a:lstStyle/>
+          <a:p>
+            <a:r>
+              <a:rPr lang="en-US" sz="1400" i="1" dirty="0">
+                <a:solidFill>
+                  <a:schemeClr val="accent3">
+                    <a:lumMod val="20000"/>
+                    <a:lumOff val="80000"/>
+                  </a:schemeClr>
+                </a:solidFill>
+              </a:rPr>
+              <a:t>No base luminance vs base luminance</a:t>
+            </a:r>
+          </a:p>
+        </p:txBody>
+      </p:sp>
       <p:pic>
         <p:nvPicPr>
-          <p:cNvPr id="10" name="Picture 9" descr="Shape&#10;&#10;Description automatically generated">
-            <a:extLst>
-              <a:ext uri="{FF2B5EF4-FFF2-40B4-BE49-F238E27FC236}">
-                <a16:creationId xmlns:a16="http://schemas.microsoft.com/office/drawing/2014/main" id="{5536DADA-A6A2-47FE-BE42-1166A7892FC5}"/>
+          <p:cNvPr id="8" name="Picture 7" descr="Icon&#10;&#10;Description automatically generated">
+            <a:extLst>
+              <a:ext uri="{FF2B5EF4-FFF2-40B4-BE49-F238E27FC236}">
+                <a16:creationId xmlns:a16="http://schemas.microsoft.com/office/drawing/2014/main" id="{73B31CB0-D1C6-41B3-A8E7-6FE9E0F7DAF3}"/>
               </a:ext>
             </a:extLst>
           </p:cNvPr>
@@ -9524,61 +9566,74 @@
               </a:ext>
             </a:extLst>
           </a:blip>
-          <a:srcRect l="11591" t="21807" r="11379" b="14535"/>
+          <a:srcRect l="15813" t="69860" r="44504"/>
           <a:stretch/>
         </p:blipFill>
         <p:spPr>
           <a:xfrm>
-            <a:off x="7318601" y="3358185"/>
-            <a:ext cx="3788711" cy="2467359"/>
+            <a:off x="9073694" y="3836263"/>
+            <a:ext cx="2696061" cy="1749874"/>
           </a:xfrm>
           <a:prstGeom prst="rect">
             <a:avLst/>
           </a:prstGeom>
+          <a:ln>
+            <a:noFill/>
+          </a:ln>
+          <a:effectLst>
+            <a:outerShdw blurRad="190500" algn="tl" rotWithShape="0">
+              <a:srgbClr val="000000">
+                <a:alpha val="70000"/>
+              </a:srgbClr>
+            </a:outerShdw>
+          </a:effectLst>
         </p:spPr>
       </p:pic>
-      <p:sp>
-        <p:nvSpPr>
-          <p:cNvPr id="14" name="TextBox 13">
-            <a:extLst>
-              <a:ext uri="{FF2B5EF4-FFF2-40B4-BE49-F238E27FC236}">
-                <a16:creationId xmlns:a16="http://schemas.microsoft.com/office/drawing/2014/main" id="{C6A2F4C2-E10D-441F-BEE7-DB36E4544901}"/>
-              </a:ext>
-            </a:extLst>
-          </p:cNvPr>
-          <p:cNvSpPr txBox="1"/>
+      <p:pic>
+        <p:nvPicPr>
+          <p:cNvPr id="6" name="Picture 5" descr="Logo, icon, company name&#10;&#10;Description automatically generated">
+            <a:extLst>
+              <a:ext uri="{FF2B5EF4-FFF2-40B4-BE49-F238E27FC236}">
+                <a16:creationId xmlns:a16="http://schemas.microsoft.com/office/drawing/2014/main" id="{A853DF66-E0F9-4359-9066-574DDB7BB85E}"/>
+              </a:ext>
+            </a:extLst>
+          </p:cNvPr>
+          <p:cNvPicPr>
+            <a:picLocks noChangeAspect="1"/>
+          </p:cNvPicPr>
           <p:nvPr/>
-        </p:nvSpPr>
+        </p:nvPicPr>
+        <p:blipFill rotWithShape="1">
+          <a:blip r:embed="rId4">
+            <a:extLst>
+              <a:ext uri="{28A0092B-C50C-407E-A947-70E740481C1C}">
+                <a14:useLocalDpi xmlns:a14="http://schemas.microsoft.com/office/drawing/2010/main" val="0"/>
+              </a:ext>
+            </a:extLst>
+          </a:blip>
+          <a:srcRect l="16876" t="70936" r="44588"/>
+          <a:stretch/>
+        </p:blipFill>
         <p:spPr>
           <a:xfrm>
-            <a:off x="8259424" y="5825544"/>
-            <a:ext cx="1907061" cy="307777"/>
+            <a:off x="6129556" y="3836263"/>
+            <a:ext cx="2944138" cy="1749874"/>
           </a:xfrm>
           <a:prstGeom prst="rect">
             <a:avLst/>
           </a:prstGeom>
-          <a:noFill/>
+          <a:ln>
+            <a:noFill/>
+          </a:ln>
+          <a:effectLst>
+            <a:outerShdw blurRad="190500" algn="tl" rotWithShape="0">
+              <a:srgbClr val="000000">
+                <a:alpha val="70000"/>
+              </a:srgbClr>
+            </a:outerShdw>
+          </a:effectLst>
         </p:spPr>
-        <p:txBody>
-          <a:bodyPr wrap="none" rtlCol="0">
-            <a:spAutoFit/>
-          </a:bodyPr>
-          <a:lstStyle/>
-          <a:p>
-            <a:r>
-              <a:rPr lang="en-US" sz="1400" i="1" dirty="0">
-                <a:solidFill>
-                  <a:schemeClr val="accent3">
-                    <a:lumMod val="20000"/>
-                    <a:lumOff val="80000"/>
-                  </a:schemeClr>
-                </a:solidFill>
-              </a:rPr>
-              <a:t>No color being returned</a:t>
-            </a:r>
-          </a:p>
-        </p:txBody>
-      </p:sp>
+      </p:pic>
     </p:spTree>
     <p:extLst>
       <p:ext uri="{BB962C8B-B14F-4D97-AF65-F5344CB8AC3E}">

</xml_diff>